<commit_message>
Finalised version of the slides
</commit_message>
<xml_diff>
--- a/Capstone project slides.pptx
+++ b/Capstone project slides.pptx
@@ -9,7 +9,10 @@
     <p:sldId id="258" r:id="rId3"/>
     <p:sldId id="259" r:id="rId4"/>
     <p:sldId id="260" r:id="rId5"/>
-    <p:sldId id="257" r:id="rId6"/>
+    <p:sldId id="261" r:id="rId6"/>
+    <p:sldId id="263" r:id="rId7"/>
+    <p:sldId id="262" r:id="rId8"/>
+    <p:sldId id="257" r:id="rId9"/>
   </p:sldIdLst>
   <p:sldSz cx="12192000" cy="6858000"/>
   <p:notesSz cx="6858000" cy="9144000"/>
@@ -117,10 +120,16 @@
             <p14:sldId id="258"/>
             <p14:sldId id="259"/>
             <p14:sldId id="260"/>
+            <p14:sldId id="261"/>
+            <p14:sldId id="263"/>
+            <p14:sldId id="262"/>
             <p14:sldId id="257"/>
           </p14:sldIdLst>
         </p14:section>
       </p14:sectionLst>
+    </p:ext>
+    <p:ext uri="{EFAFB233-063F-42B5-8137-9DF3F51BA10A}">
+      <p15:sldGuideLst xmlns:p15="http://schemas.microsoft.com/office/powerpoint/2012/main"/>
     </p:ext>
   </p:extLst>
 </p:presentation>
@@ -5880,7 +5889,7 @@
             <a:pPr algn="l"/>
             <a:r>
               <a:rPr lang="en-US" sz="3200" b="1" dirty="0"/>
-              <a:t>                    @</a:t>
+              <a:t>                    @Daniela </a:t>
             </a:r>
             <a:r>
               <a:rPr lang="en-US" sz="3200" b="1" dirty="0" err="1"/>
@@ -5896,13 +5905,12 @@
             </a:r>
             <a:r>
               <a:rPr lang="en-US" sz="3200" b="1" dirty="0" err="1"/>
-              <a:t>Chinnie</a:t>
-            </a:r>
-            <a:endParaRPr lang="en-US" sz="3200" b="1" dirty="0"/>
-          </a:p>
-          <a:p>
-            <a:pPr algn="l"/>
-            <a:endParaRPr lang="en-US" sz="3200" b="1" dirty="0"/>
+              <a:t>Chinenye</a:t>
+            </a:r>
+            <a:r>
+              <a:rPr lang="en-US" sz="3200" b="1" dirty="0"/>
+              <a:t> Okeke</a:t>
+            </a:r>
           </a:p>
           <a:p>
             <a:endParaRPr lang="en-US" dirty="0"/>
@@ -6304,38 +6312,51 @@
         </p:nvSpPr>
         <p:spPr/>
         <p:txBody>
-          <a:bodyPr/>
-          <a:lstStyle/>
-          <a:p>
-            <a:endParaRPr lang="en-US"/>
-          </a:p>
-        </p:txBody>
-      </p:sp>
-      <p:sp>
-        <p:nvSpPr>
-          <p:cNvPr id="3" name="Content Placeholder 2">
+          <a:bodyPr>
+            <a:normAutofit fontScale="90000"/>
+          </a:bodyPr>
+          <a:lstStyle/>
+          <a:p>
+            <a:r>
+              <a:rPr lang="en-GB" dirty="0"/>
+              <a:t>Do countries where BCG vaccine was widely implemented have higher life expectancy? </a:t>
+            </a:r>
+            <a:br>
+              <a:rPr lang="en-GB" dirty="0"/>
+            </a:br>
+            <a:endParaRPr lang="en-US" dirty="0"/>
+          </a:p>
+        </p:txBody>
+      </p:sp>
+      <p:pic>
+        <p:nvPicPr>
+          <p:cNvPr id="6" name="Content Placeholder 5">
             <a:extLst>
               <a:ext uri="{FF2B5EF4-FFF2-40B4-BE49-F238E27FC236}">
-                <a16:creationId xmlns:a16="http://schemas.microsoft.com/office/drawing/2014/main" id="{25516659-CEF0-46F6-BA22-15CF0C3B34ED}"/>
+                <a16:creationId xmlns:a16="http://schemas.microsoft.com/office/drawing/2014/main" id="{589BB6E8-6B6A-4A0D-AD22-50BCB56DD926}"/>
               </a:ext>
             </a:extLst>
           </p:cNvPr>
-          <p:cNvSpPr>
-            <a:spLocks noGrp="1"/>
-          </p:cNvSpPr>
+          <p:cNvPicPr>
+            <a:picLocks noGrp="1" noChangeAspect="1"/>
+          </p:cNvPicPr>
           <p:nvPr>
             <p:ph idx="1"/>
           </p:nvPr>
-        </p:nvSpPr>
-        <p:spPr/>
-        <p:txBody>
-          <a:bodyPr/>
-          <a:lstStyle/>
-          <a:p>
-            <a:endParaRPr lang="en-US"/>
-          </a:p>
-        </p:txBody>
-      </p:sp>
+        </p:nvPicPr>
+        <p:blipFill>
+          <a:blip r:embed="rId2"/>
+          <a:stretch>
+            <a:fillRect/>
+          </a:stretch>
+        </p:blipFill>
+        <p:spPr>
+          <a:xfrm>
+            <a:off x="1941857" y="1641303"/>
+            <a:ext cx="7619311" cy="4850216"/>
+          </a:xfrm>
+        </p:spPr>
+      </p:pic>
     </p:spTree>
     <p:extLst>
       <p:ext uri="{BB962C8B-B14F-4D97-AF65-F5344CB8AC3E}">
@@ -6371,6 +6392,374 @@
           <p:cNvPr id="2" name="Title 1">
             <a:extLst>
               <a:ext uri="{FF2B5EF4-FFF2-40B4-BE49-F238E27FC236}">
+                <a16:creationId xmlns:a16="http://schemas.microsoft.com/office/drawing/2014/main" id="{EC4ECB2D-0D70-4DF7-8AD2-3AA9BABDF392}"/>
+              </a:ext>
+            </a:extLst>
+          </p:cNvPr>
+          <p:cNvSpPr>
+            <a:spLocks noGrp="1"/>
+          </p:cNvSpPr>
+          <p:nvPr>
+            <p:ph type="title"/>
+          </p:nvPr>
+        </p:nvSpPr>
+        <p:spPr/>
+        <p:txBody>
+          <a:bodyPr anchor="t">
+            <a:noAutofit/>
+          </a:bodyPr>
+          <a:lstStyle/>
+          <a:p>
+            <a:r>
+              <a:rPr lang="en-GB" sz="2400" dirty="0"/>
+              <a:t>1. shows that even countries with high </a:t>
+            </a:r>
+            <a:r>
+              <a:rPr lang="en-GB" sz="2400" dirty="0" err="1"/>
+              <a:t>bcg</a:t>
+            </a:r>
+            <a:r>
+              <a:rPr lang="en-GB" sz="2400" dirty="0"/>
+              <a:t> coverage have lower life expectancy=&lt;60</a:t>
+            </a:r>
+            <a:br>
+              <a:rPr lang="en-GB" sz="2400" dirty="0"/>
+            </a:br>
+            <a:br>
+              <a:rPr lang="en-GB" sz="2400" dirty="0"/>
+            </a:br>
+            <a:r>
+              <a:rPr lang="en-GB" sz="2400" dirty="0"/>
+              <a:t>2. shows that even countries with lower </a:t>
+            </a:r>
+            <a:r>
+              <a:rPr lang="en-GB" sz="2400" dirty="0" err="1"/>
+              <a:t>bcg</a:t>
+            </a:r>
+            <a:r>
+              <a:rPr lang="en-GB" sz="2400" dirty="0"/>
+              <a:t> coverage=&lt;40 have higher life expectancy</a:t>
+            </a:r>
+            <a:br>
+              <a:rPr lang="en-GB" sz="2400" dirty="0"/>
+            </a:br>
+            <a:br>
+              <a:rPr lang="en-GB" sz="2400" dirty="0"/>
+            </a:br>
+            <a:endParaRPr lang="en-US" sz="2400" dirty="0"/>
+          </a:p>
+        </p:txBody>
+      </p:sp>
+      <p:pic>
+        <p:nvPicPr>
+          <p:cNvPr id="5" name="Content Placeholder 4">
+            <a:extLst>
+              <a:ext uri="{FF2B5EF4-FFF2-40B4-BE49-F238E27FC236}">
+                <a16:creationId xmlns:a16="http://schemas.microsoft.com/office/drawing/2014/main" id="{6101A5F1-18C9-4B5F-8CFB-5D9E5F0733D1}"/>
+              </a:ext>
+            </a:extLst>
+          </p:cNvPr>
+          <p:cNvPicPr>
+            <a:picLocks noGrp="1" noChangeAspect="1"/>
+          </p:cNvPicPr>
+          <p:nvPr>
+            <p:ph idx="1"/>
+          </p:nvPr>
+        </p:nvPicPr>
+        <p:blipFill>
+          <a:blip r:embed="rId2"/>
+          <a:stretch>
+            <a:fillRect/>
+          </a:stretch>
+        </p:blipFill>
+        <p:spPr>
+          <a:xfrm>
+            <a:off x="367402" y="2663688"/>
+            <a:ext cx="4714049" cy="4061791"/>
+          </a:xfrm>
+        </p:spPr>
+      </p:pic>
+      <p:pic>
+        <p:nvPicPr>
+          <p:cNvPr id="7" name="Picture 6">
+            <a:extLst>
+              <a:ext uri="{FF2B5EF4-FFF2-40B4-BE49-F238E27FC236}">
+                <a16:creationId xmlns:a16="http://schemas.microsoft.com/office/drawing/2014/main" id="{634349B0-E3B3-4788-B109-2233EB7945B2}"/>
+              </a:ext>
+            </a:extLst>
+          </p:cNvPr>
+          <p:cNvPicPr>
+            <a:picLocks noChangeAspect="1"/>
+          </p:cNvPicPr>
+          <p:nvPr/>
+        </p:nvPicPr>
+        <p:blipFill>
+          <a:blip r:embed="rId3"/>
+          <a:stretch>
+            <a:fillRect/>
+          </a:stretch>
+        </p:blipFill>
+        <p:spPr>
+          <a:xfrm>
+            <a:off x="5646733" y="2676940"/>
+            <a:ext cx="5340881" cy="2570921"/>
+          </a:xfrm>
+          <a:prstGeom prst="rect">
+            <a:avLst/>
+          </a:prstGeom>
+        </p:spPr>
+      </p:pic>
+    </p:spTree>
+    <p:extLst>
+      <p:ext uri="{BB962C8B-B14F-4D97-AF65-F5344CB8AC3E}">
+        <p14:creationId xmlns:p14="http://schemas.microsoft.com/office/powerpoint/2010/main" val="249997136"/>
+      </p:ext>
+    </p:extLst>
+  </p:cSld>
+  <p:clrMapOvr>
+    <a:masterClrMapping/>
+  </p:clrMapOvr>
+</p:sld>
+</file>
+
+<file path=ppt/slides/slide6.xml><?xml version="1.0" encoding="utf-8"?>
+<p:sld xmlns:a="http://schemas.openxmlformats.org/drawingml/2006/main" xmlns:r="http://schemas.openxmlformats.org/officeDocument/2006/relationships" xmlns:p="http://schemas.openxmlformats.org/presentationml/2006/main">
+  <p:cSld>
+    <p:spTree>
+      <p:nvGrpSpPr>
+        <p:cNvPr id="1" name=""/>
+        <p:cNvGrpSpPr/>
+        <p:nvPr/>
+      </p:nvGrpSpPr>
+      <p:grpSpPr>
+        <a:xfrm>
+          <a:off x="0" y="0"/>
+          <a:ext cx="0" cy="0"/>
+          <a:chOff x="0" y="0"/>
+          <a:chExt cx="0" cy="0"/>
+        </a:xfrm>
+      </p:grpSpPr>
+      <p:sp>
+        <p:nvSpPr>
+          <p:cNvPr id="2" name="Title 1">
+            <a:extLst>
+              <a:ext uri="{FF2B5EF4-FFF2-40B4-BE49-F238E27FC236}">
+                <a16:creationId xmlns:a16="http://schemas.microsoft.com/office/drawing/2014/main" id="{4C1B996E-682B-4698-84D7-421AA578596C}"/>
+              </a:ext>
+            </a:extLst>
+          </p:cNvPr>
+          <p:cNvSpPr>
+            <a:spLocks noGrp="1"/>
+          </p:cNvSpPr>
+          <p:nvPr>
+            <p:ph type="title"/>
+          </p:nvPr>
+        </p:nvSpPr>
+        <p:spPr>
+          <a:xfrm>
+            <a:off x="685801" y="371062"/>
+            <a:ext cx="10131425" cy="1694806"/>
+          </a:xfrm>
+        </p:spPr>
+        <p:txBody>
+          <a:bodyPr>
+            <a:normAutofit fontScale="90000"/>
+          </a:bodyPr>
+          <a:lstStyle/>
+          <a:p>
+            <a:r>
+              <a:rPr lang="en-GB" dirty="0"/>
+              <a:t>Do countries where BCG vaccine was widely implemented have fewer infection rates per million?</a:t>
+            </a:r>
+            <a:br>
+              <a:rPr lang="en-GB" dirty="0"/>
+            </a:br>
+            <a:endParaRPr lang="en-US" dirty="0"/>
+          </a:p>
+        </p:txBody>
+      </p:sp>
+      <p:pic>
+        <p:nvPicPr>
+          <p:cNvPr id="5" name="Content Placeholder 4">
+            <a:extLst>
+              <a:ext uri="{FF2B5EF4-FFF2-40B4-BE49-F238E27FC236}">
+                <a16:creationId xmlns:a16="http://schemas.microsoft.com/office/drawing/2014/main" id="{2250379C-70F6-480A-A067-D12B4727AED9}"/>
+              </a:ext>
+            </a:extLst>
+          </p:cNvPr>
+          <p:cNvPicPr>
+            <a:picLocks noGrp="1" noChangeAspect="1"/>
+          </p:cNvPicPr>
+          <p:nvPr>
+            <p:ph idx="1"/>
+          </p:nvPr>
+        </p:nvPicPr>
+        <p:blipFill>
+          <a:blip r:embed="rId2"/>
+          <a:stretch>
+            <a:fillRect/>
+          </a:stretch>
+        </p:blipFill>
+        <p:spPr>
+          <a:xfrm>
+            <a:off x="2067338" y="2011657"/>
+            <a:ext cx="6612835" cy="4413683"/>
+          </a:xfrm>
+        </p:spPr>
+      </p:pic>
+    </p:spTree>
+    <p:extLst>
+      <p:ext uri="{BB962C8B-B14F-4D97-AF65-F5344CB8AC3E}">
+        <p14:creationId xmlns:p14="http://schemas.microsoft.com/office/powerpoint/2010/main" val="3798770676"/>
+      </p:ext>
+    </p:extLst>
+  </p:cSld>
+  <p:clrMapOvr>
+    <a:masterClrMapping/>
+  </p:clrMapOvr>
+</p:sld>
+</file>
+
+<file path=ppt/slides/slide7.xml><?xml version="1.0" encoding="utf-8"?>
+<p:sld xmlns:a="http://schemas.openxmlformats.org/drawingml/2006/main" xmlns:r="http://schemas.openxmlformats.org/officeDocument/2006/relationships" xmlns:p="http://schemas.openxmlformats.org/presentationml/2006/main">
+  <p:cSld>
+    <p:spTree>
+      <p:nvGrpSpPr>
+        <p:cNvPr id="1" name=""/>
+        <p:cNvGrpSpPr/>
+        <p:nvPr/>
+      </p:nvGrpSpPr>
+      <p:grpSpPr>
+        <a:xfrm>
+          <a:off x="0" y="0"/>
+          <a:ext cx="0" cy="0"/>
+          <a:chOff x="0" y="0"/>
+          <a:chExt cx="0" cy="0"/>
+        </a:xfrm>
+      </p:grpSpPr>
+      <p:sp>
+        <p:nvSpPr>
+          <p:cNvPr id="2" name="Title 1">
+            <a:extLst>
+              <a:ext uri="{FF2B5EF4-FFF2-40B4-BE49-F238E27FC236}">
+                <a16:creationId xmlns:a16="http://schemas.microsoft.com/office/drawing/2014/main" id="{DE45CCF9-F390-4D7A-94C3-55E6A270600F}"/>
+              </a:ext>
+            </a:extLst>
+          </p:cNvPr>
+          <p:cNvSpPr>
+            <a:spLocks noGrp="1"/>
+          </p:cNvSpPr>
+          <p:nvPr>
+            <p:ph type="title"/>
+          </p:nvPr>
+        </p:nvSpPr>
+        <p:spPr/>
+        <p:txBody>
+          <a:bodyPr/>
+          <a:lstStyle/>
+          <a:p>
+            <a:r>
+              <a:rPr lang="en-GB" dirty="0"/>
+              <a:t>What is the most Covid-19 affected continent in terms of infected cases and deaths?</a:t>
+            </a:r>
+            <a:endParaRPr lang="en-US" dirty="0"/>
+          </a:p>
+        </p:txBody>
+      </p:sp>
+      <p:pic>
+        <p:nvPicPr>
+          <p:cNvPr id="5" name="Content Placeholder 4">
+            <a:extLst>
+              <a:ext uri="{FF2B5EF4-FFF2-40B4-BE49-F238E27FC236}">
+                <a16:creationId xmlns:a16="http://schemas.microsoft.com/office/drawing/2014/main" id="{68E85CC2-E297-40D7-9E2E-C28C6C609817}"/>
+              </a:ext>
+            </a:extLst>
+          </p:cNvPr>
+          <p:cNvPicPr>
+            <a:picLocks noGrp="1" noChangeAspect="1"/>
+          </p:cNvPicPr>
+          <p:nvPr>
+            <p:ph idx="1"/>
+          </p:nvPr>
+        </p:nvPicPr>
+        <p:blipFill>
+          <a:blip r:embed="rId2"/>
+          <a:stretch>
+            <a:fillRect/>
+          </a:stretch>
+        </p:blipFill>
+        <p:spPr>
+          <a:xfrm>
+            <a:off x="470974" y="2270435"/>
+            <a:ext cx="5439566" cy="3977965"/>
+          </a:xfrm>
+        </p:spPr>
+      </p:pic>
+      <p:pic>
+        <p:nvPicPr>
+          <p:cNvPr id="7" name="Picture 6">
+            <a:extLst>
+              <a:ext uri="{FF2B5EF4-FFF2-40B4-BE49-F238E27FC236}">
+                <a16:creationId xmlns:a16="http://schemas.microsoft.com/office/drawing/2014/main" id="{CDE1893A-E258-4C67-8437-1570BC9A7890}"/>
+              </a:ext>
+            </a:extLst>
+          </p:cNvPr>
+          <p:cNvPicPr>
+            <a:picLocks noChangeAspect="1"/>
+          </p:cNvPicPr>
+          <p:nvPr/>
+        </p:nvPicPr>
+        <p:blipFill>
+          <a:blip r:embed="rId3"/>
+          <a:stretch>
+            <a:fillRect/>
+          </a:stretch>
+        </p:blipFill>
+        <p:spPr>
+          <a:xfrm>
+            <a:off x="5101692" y="2270434"/>
+            <a:ext cx="6619334" cy="3977965"/>
+          </a:xfrm>
+          <a:prstGeom prst="rect">
+            <a:avLst/>
+          </a:prstGeom>
+        </p:spPr>
+      </p:pic>
+    </p:spTree>
+    <p:extLst>
+      <p:ext uri="{BB962C8B-B14F-4D97-AF65-F5344CB8AC3E}">
+        <p14:creationId xmlns:p14="http://schemas.microsoft.com/office/powerpoint/2010/main" val="543821089"/>
+      </p:ext>
+    </p:extLst>
+  </p:cSld>
+  <p:clrMapOvr>
+    <a:masterClrMapping/>
+  </p:clrMapOvr>
+</p:sld>
+</file>
+
+<file path=ppt/slides/slide8.xml><?xml version="1.0" encoding="utf-8"?>
+<p:sld xmlns:a="http://schemas.openxmlformats.org/drawingml/2006/main" xmlns:r="http://schemas.openxmlformats.org/officeDocument/2006/relationships" xmlns:p="http://schemas.openxmlformats.org/presentationml/2006/main">
+  <p:cSld>
+    <p:spTree>
+      <p:nvGrpSpPr>
+        <p:cNvPr id="1" name=""/>
+        <p:cNvGrpSpPr/>
+        <p:nvPr/>
+      </p:nvGrpSpPr>
+      <p:grpSpPr>
+        <a:xfrm>
+          <a:off x="0" y="0"/>
+          <a:ext cx="0" cy="0"/>
+          <a:chOff x="0" y="0"/>
+          <a:chExt cx="0" cy="0"/>
+        </a:xfrm>
+      </p:grpSpPr>
+      <p:sp>
+        <p:nvSpPr>
+          <p:cNvPr id="2" name="Title 1">
+            <a:extLst>
+              <a:ext uri="{FF2B5EF4-FFF2-40B4-BE49-F238E27FC236}">
                 <a16:creationId xmlns:a16="http://schemas.microsoft.com/office/drawing/2014/main" id="{A5338DB4-8FC6-4E05-9DF8-1B7A869AB304}"/>
               </a:ext>
             </a:extLst>
@@ -6425,8 +6814,8 @@
         </p:blipFill>
         <p:spPr>
           <a:xfrm>
-            <a:off x="1497496" y="1853067"/>
-            <a:ext cx="8666921" cy="4832604"/>
+            <a:off x="1497496" y="1881808"/>
+            <a:ext cx="8615377" cy="4803863"/>
           </a:xfrm>
         </p:spPr>
       </p:pic>

</xml_diff>